<commit_message>
Update Twitter followers. Update logo.
</commit_message>
<xml_diff>
--- a/Meeting20150425/Migration to github.pptx
+++ b/Meeting20150425/Migration to github.pptx
@@ -30986,8 +30986,8 @@
         </p:blipFill>
         <p:spPr>
           <a:xfrm>
-            <a:off x="-12" y="4543412"/>
-            <a:ext cx="6010275" cy="600075"/>
+            <a:off x="0" y="3995850"/>
+            <a:ext cx="3443002" cy="1147649"/>
           </a:xfrm>
           <a:prstGeom prst="rect">
             <a:avLst/>
@@ -32719,9 +32719,9 @@
 </file>
 
 <file path=ppt/theme/theme1.xml><?xml version="1.0" encoding="utf-8"?>
-<a:theme xmlns:a="http://schemas.openxmlformats.org/drawingml/2006/main" xmlns:r="http://schemas.openxmlformats.org/officeDocument/2006/relationships" name="Custom Theme">
+<a:theme xmlns:a="http://schemas.openxmlformats.org/drawingml/2006/main" xmlns:r="http://schemas.openxmlformats.org/officeDocument/2006/relationships" name="sketched">
   <a:themeElements>
-    <a:clrScheme name="Default">
+    <a:clrScheme name="Custom 398">
       <a:dk1>
         <a:srgbClr val="000000"/>
       </a:dk1>
@@ -32729,34 +32729,34 @@
         <a:srgbClr val="FFFFFF"/>
       </a:lt1>
       <a:dk2>
-        <a:srgbClr val="158158"/>
+        <a:srgbClr val="51535D"/>
       </a:dk2>
       <a:lt2>
-        <a:srgbClr val="F3F3F3"/>
+        <a:srgbClr val="EDEDED"/>
       </a:lt2>
       <a:accent1>
-        <a:srgbClr val="058DC7"/>
+        <a:srgbClr val="676871"/>
       </a:accent1>
       <a:accent2>
-        <a:srgbClr val="50B432"/>
+        <a:srgbClr val="988489"/>
       </a:accent2>
       <a:accent3>
-        <a:srgbClr val="ED561B"/>
+        <a:srgbClr val="6B7B67"/>
       </a:accent3>
       <a:accent4>
-        <a:srgbClr val="EDEF00"/>
+        <a:srgbClr val="747B85"/>
       </a:accent4>
       <a:accent5>
-        <a:srgbClr val="24CBE5"/>
+        <a:srgbClr val="A5A9AF"/>
       </a:accent5>
       <a:accent6>
-        <a:srgbClr val="64E572"/>
+        <a:srgbClr val="85716D"/>
       </a:accent6>
       <a:hlink>
-        <a:srgbClr val="2200CC"/>
+        <a:srgbClr val="676871"/>
       </a:hlink>
       <a:folHlink>
-        <a:srgbClr val="551A8B"/>
+        <a:srgbClr val="3F414A"/>
       </a:folHlink>
     </a:clrScheme>
     <a:fontScheme name="Office">
@@ -32996,9 +32996,9 @@
 </file>
 
 <file path=ppt/theme/theme2.xml><?xml version="1.0" encoding="utf-8"?>
-<a:theme xmlns:a="http://schemas.openxmlformats.org/drawingml/2006/main" xmlns:r="http://schemas.openxmlformats.org/officeDocument/2006/relationships" name="sketched">
+<a:theme xmlns:a="http://schemas.openxmlformats.org/drawingml/2006/main" xmlns:r="http://schemas.openxmlformats.org/officeDocument/2006/relationships" name="Custom Theme">
   <a:themeElements>
-    <a:clrScheme name="Custom 398">
+    <a:clrScheme name="Default">
       <a:dk1>
         <a:srgbClr val="000000"/>
       </a:dk1>
@@ -33006,34 +33006,34 @@
         <a:srgbClr val="FFFFFF"/>
       </a:lt1>
       <a:dk2>
-        <a:srgbClr val="51535D"/>
+        <a:srgbClr val="158158"/>
       </a:dk2>
       <a:lt2>
-        <a:srgbClr val="EDEDED"/>
+        <a:srgbClr val="F3F3F3"/>
       </a:lt2>
       <a:accent1>
-        <a:srgbClr val="676871"/>
+        <a:srgbClr val="058DC7"/>
       </a:accent1>
       <a:accent2>
-        <a:srgbClr val="988489"/>
+        <a:srgbClr val="50B432"/>
       </a:accent2>
       <a:accent3>
-        <a:srgbClr val="6B7B67"/>
+        <a:srgbClr val="ED561B"/>
       </a:accent3>
       <a:accent4>
-        <a:srgbClr val="747B85"/>
+        <a:srgbClr val="EDEF00"/>
       </a:accent4>
       <a:accent5>
-        <a:srgbClr val="A5A9AF"/>
+        <a:srgbClr val="24CBE5"/>
       </a:accent5>
       <a:accent6>
-        <a:srgbClr val="85716D"/>
+        <a:srgbClr val="64E572"/>
       </a:accent6>
       <a:hlink>
-        <a:srgbClr val="676871"/>
+        <a:srgbClr val="2200CC"/>
       </a:hlink>
       <a:folHlink>
-        <a:srgbClr val="3F414A"/>
+        <a:srgbClr val="551A8B"/>
       </a:folHlink>
     </a:clrScheme>
     <a:fontScheme name="Office">

</xml_diff>